<commit_message>
Ajout de la ligne 'Prise en charge du reseau'
</commit_message>
<xml_diff>
--- a/presentation/Gestionnaires de versions.pptx
+++ b/presentation/Gestionnaires de versions.pptx
@@ -9214,7 +9214,22 @@
             <a:pPr lvl="2"/>
             <a:r>
               <a:rPr lang="fr-FR" dirty="0" smtClean="0"/>
-              <a:t>Architecture centralisée/décentralisée</a:t>
+              <a:t>Prise en charge </a:t>
+            </a:r>
+            <a:r>
+              <a:rPr lang="fr-FR" smtClean="0"/>
+              <a:t>du réseau</a:t>
+            </a:r>
+          </a:p>
+          <a:p>
+            <a:pPr lvl="2"/>
+            <a:r>
+              <a:rPr lang="fr-FR" smtClean="0"/>
+              <a:t>Architecture </a:t>
+            </a:r>
+            <a:r>
+              <a:rPr lang="fr-FR" dirty="0" smtClean="0"/>
+              <a:t>centralisée/décentralisée</a:t>
             </a:r>
           </a:p>
           <a:p>

</xml_diff>